<commit_message>
changing figure in tree planting scenario to swap x and y axis
</commit_message>
<xml_diff>
--- a/Figures/Landcover_Map_figure.pptx
+++ b/Figures/Landcover_Map_figure.pptx
@@ -105,6 +105,11 @@
       </a:defRPr>
     </a:lvl9pPr>
   </p:defaultTextStyle>
+  <p:extLst>
+    <p:ext uri="{EFAFB233-063F-42B5-8137-9DF3F51BA10A}">
+      <p15:sldGuideLst xmlns:p15="http://schemas.microsoft.com/office/powerpoint/2012/main"/>
+    </p:ext>
+  </p:extLst>
 </p:presentation>
 </file>
 
@@ -255,7 +260,7 @@
           <a:p>
             <a:fld id="{4056C876-C76B-46F2-BD2E-1BD877968038}" type="datetimeFigureOut">
               <a:rPr lang="en-US" smtClean="0"/>
-              <a:t>7/31/2024</a:t>
+              <a:t>8/12/2024</a:t>
             </a:fld>
             <a:endParaRPr lang="en-US"/>
           </a:p>
@@ -453,7 +458,7 @@
           <a:p>
             <a:fld id="{4056C876-C76B-46F2-BD2E-1BD877968038}" type="datetimeFigureOut">
               <a:rPr lang="en-US" smtClean="0"/>
-              <a:t>7/31/2024</a:t>
+              <a:t>8/12/2024</a:t>
             </a:fld>
             <a:endParaRPr lang="en-US"/>
           </a:p>
@@ -661,7 +666,7 @@
           <a:p>
             <a:fld id="{4056C876-C76B-46F2-BD2E-1BD877968038}" type="datetimeFigureOut">
               <a:rPr lang="en-US" smtClean="0"/>
-              <a:t>7/31/2024</a:t>
+              <a:t>8/12/2024</a:t>
             </a:fld>
             <a:endParaRPr lang="en-US"/>
           </a:p>
@@ -859,7 +864,7 @@
           <a:p>
             <a:fld id="{4056C876-C76B-46F2-BD2E-1BD877968038}" type="datetimeFigureOut">
               <a:rPr lang="en-US" smtClean="0"/>
-              <a:t>7/31/2024</a:t>
+              <a:t>8/12/2024</a:t>
             </a:fld>
             <a:endParaRPr lang="en-US"/>
           </a:p>
@@ -1134,7 +1139,7 @@
           <a:p>
             <a:fld id="{4056C876-C76B-46F2-BD2E-1BD877968038}" type="datetimeFigureOut">
               <a:rPr lang="en-US" smtClean="0"/>
-              <a:t>7/31/2024</a:t>
+              <a:t>8/12/2024</a:t>
             </a:fld>
             <a:endParaRPr lang="en-US"/>
           </a:p>
@@ -1399,7 +1404,7 @@
           <a:p>
             <a:fld id="{4056C876-C76B-46F2-BD2E-1BD877968038}" type="datetimeFigureOut">
               <a:rPr lang="en-US" smtClean="0"/>
-              <a:t>7/31/2024</a:t>
+              <a:t>8/12/2024</a:t>
             </a:fld>
             <a:endParaRPr lang="en-US"/>
           </a:p>
@@ -1811,7 +1816,7 @@
           <a:p>
             <a:fld id="{4056C876-C76B-46F2-BD2E-1BD877968038}" type="datetimeFigureOut">
               <a:rPr lang="en-US" smtClean="0"/>
-              <a:t>7/31/2024</a:t>
+              <a:t>8/12/2024</a:t>
             </a:fld>
             <a:endParaRPr lang="en-US"/>
           </a:p>
@@ -1952,7 +1957,7 @@
           <a:p>
             <a:fld id="{4056C876-C76B-46F2-BD2E-1BD877968038}" type="datetimeFigureOut">
               <a:rPr lang="en-US" smtClean="0"/>
-              <a:t>7/31/2024</a:t>
+              <a:t>8/12/2024</a:t>
             </a:fld>
             <a:endParaRPr lang="en-US"/>
           </a:p>
@@ -2065,7 +2070,7 @@
           <a:p>
             <a:fld id="{4056C876-C76B-46F2-BD2E-1BD877968038}" type="datetimeFigureOut">
               <a:rPr lang="en-US" smtClean="0"/>
-              <a:t>7/31/2024</a:t>
+              <a:t>8/12/2024</a:t>
             </a:fld>
             <a:endParaRPr lang="en-US"/>
           </a:p>
@@ -2376,7 +2381,7 @@
           <a:p>
             <a:fld id="{4056C876-C76B-46F2-BD2E-1BD877968038}" type="datetimeFigureOut">
               <a:rPr lang="en-US" smtClean="0"/>
-              <a:t>7/31/2024</a:t>
+              <a:t>8/12/2024</a:t>
             </a:fld>
             <a:endParaRPr lang="en-US"/>
           </a:p>
@@ -2664,7 +2669,7 @@
           <a:p>
             <a:fld id="{4056C876-C76B-46F2-BD2E-1BD877968038}" type="datetimeFigureOut">
               <a:rPr lang="en-US" smtClean="0"/>
-              <a:t>7/31/2024</a:t>
+              <a:t>8/12/2024</a:t>
             </a:fld>
             <a:endParaRPr lang="en-US"/>
           </a:p>
@@ -2905,7 +2910,7 @@
           <a:p>
             <a:fld id="{4056C876-C76B-46F2-BD2E-1BD877968038}" type="datetimeFigureOut">
               <a:rPr lang="en-US" smtClean="0"/>
-              <a:t>7/31/2024</a:t>
+              <a:t>8/12/2024</a:t>
             </a:fld>
             <a:endParaRPr lang="en-US"/>
           </a:p>
@@ -3621,45 +3626,7 @@
                 <a:latin typeface="Times New Roman" panose="02020603050405020304" pitchFamily="18" charset="0"/>
                 <a:cs typeface="Times New Roman" panose="02020603050405020304" pitchFamily="18" charset="0"/>
               </a:rPr>
-              <a:t>.2 miles</a:t>
-            </a:r>
-          </a:p>
-        </p:txBody>
-      </p:sp>
-      <p:sp>
-        <p:nvSpPr>
-          <p:cNvPr id="27" name="TextBox 26">
-            <a:extLst>
-              <a:ext uri="{FF2B5EF4-FFF2-40B4-BE49-F238E27FC236}">
-                <a16:creationId xmlns:a16="http://schemas.microsoft.com/office/drawing/2014/main" id="{FE611881-8F21-917B-C6DF-C1E094E96ED6}"/>
-              </a:ext>
-            </a:extLst>
-          </p:cNvPr>
-          <p:cNvSpPr txBox="1"/>
-          <p:nvPr/>
-        </p:nvSpPr>
-        <p:spPr>
-          <a:xfrm>
-            <a:off x="8205777" y="6108754"/>
-            <a:ext cx="343191" cy="246221"/>
-          </a:xfrm>
-          <a:prstGeom prst="rect">
-            <a:avLst/>
-          </a:prstGeom>
-          <a:noFill/>
-        </p:spPr>
-        <p:txBody>
-          <a:bodyPr wrap="square" rtlCol="0">
-            <a:spAutoFit/>
-          </a:bodyPr>
-          <a:lstStyle/>
-          <a:p>
-            <a:r>
-              <a:rPr lang="en-US" sz="1000" dirty="0">
-                <a:latin typeface="Times New Roman" panose="02020603050405020304" pitchFamily="18" charset="0"/>
-                <a:cs typeface="Times New Roman" panose="02020603050405020304" pitchFamily="18" charset="0"/>
-              </a:rPr>
-              <a:t>0</a:t>
+              <a:t>300 m</a:t>
             </a:r>
           </a:p>
         </p:txBody>
@@ -3795,8 +3762,8 @@
         </p:nvSpPr>
         <p:spPr>
           <a:xfrm>
-            <a:off x="8548968" y="6105011"/>
-            <a:ext cx="343191" cy="246221"/>
+            <a:off x="8397889" y="6108753"/>
+            <a:ext cx="893347" cy="246221"/>
           </a:xfrm>
           <a:prstGeom prst="rect">
             <a:avLst/>
@@ -3814,7 +3781,7 @@
                 <a:latin typeface="Times New Roman" panose="02020603050405020304" pitchFamily="18" charset="0"/>
                 <a:cs typeface="Times New Roman" panose="02020603050405020304" pitchFamily="18" charset="0"/>
               </a:rPr>
-              <a:t>.1</a:t>
+              <a:t>150 m</a:t>
             </a:r>
           </a:p>
         </p:txBody>
@@ -3968,7 +3935,7 @@
         <p:spPr>
           <a:xfrm>
             <a:off x="3494015" y="3814218"/>
-            <a:ext cx="1694329" cy="461665"/>
+            <a:ext cx="1694329" cy="276999"/>
           </a:xfrm>
           <a:prstGeom prst="rect">
             <a:avLst/>
@@ -3988,7 +3955,7 @@
                   <a:schemeClr val="bg1"/>
                 </a:solidFill>
               </a:rPr>
-              <a:t>Uniformly Forested Riparian Zone</a:t>
+              <a:t>Forested Baseline</a:t>
             </a:r>
           </a:p>
         </p:txBody>
@@ -4007,8 +3974,8 @@
         </p:nvSpPr>
         <p:spPr>
           <a:xfrm>
-            <a:off x="5735756" y="3792068"/>
-            <a:ext cx="1694329" cy="461665"/>
+            <a:off x="5735757" y="3792068"/>
+            <a:ext cx="1508108" cy="461665"/>
           </a:xfrm>
           <a:prstGeom prst="rect">
             <a:avLst/>
@@ -4028,7 +3995,566 @@
                   <a:schemeClr val="bg1"/>
                 </a:solidFill>
               </a:rPr>
-              <a:t>Uniform Grassed Riparian Zone</a:t>
+              <a:t>Non-forested Baseline</a:t>
+            </a:r>
+          </a:p>
+        </p:txBody>
+      </p:sp>
+      <p:sp>
+        <p:nvSpPr>
+          <p:cNvPr id="2" name="Rectangle 1">
+            <a:extLst>
+              <a:ext uri="{FF2B5EF4-FFF2-40B4-BE49-F238E27FC236}">
+                <a16:creationId xmlns:a16="http://schemas.microsoft.com/office/drawing/2014/main" id="{A1F7D68A-0B33-9BEA-394F-4A40D34C122F}"/>
+              </a:ext>
+            </a:extLst>
+          </p:cNvPr>
+          <p:cNvSpPr/>
+          <p:nvPr/>
+        </p:nvSpPr>
+        <p:spPr>
+          <a:xfrm>
+            <a:off x="8490693" y="2768626"/>
+            <a:ext cx="549294" cy="2133136"/>
+          </a:xfrm>
+          <a:prstGeom prst="rect">
+            <a:avLst/>
+          </a:prstGeom>
+          <a:solidFill>
+            <a:srgbClr val="E1E1E1"/>
+          </a:solidFill>
+          <a:ln>
+            <a:noFill/>
+          </a:ln>
+        </p:spPr>
+        <p:style>
+          <a:lnRef idx="2">
+            <a:schemeClr val="accent1">
+              <a:shade val="15000"/>
+            </a:schemeClr>
+          </a:lnRef>
+          <a:fillRef idx="1">
+            <a:schemeClr val="accent1"/>
+          </a:fillRef>
+          <a:effectRef idx="0">
+            <a:schemeClr val="accent1"/>
+          </a:effectRef>
+          <a:fontRef idx="minor">
+            <a:schemeClr val="lt1"/>
+          </a:fontRef>
+        </p:style>
+        <p:txBody>
+          <a:bodyPr rtlCol="0" anchor="ctr"/>
+          <a:lstStyle/>
+          <a:p>
+            <a:pPr algn="ctr"/>
+            <a:endParaRPr lang="en-US"/>
+          </a:p>
+        </p:txBody>
+      </p:sp>
+      <p:sp>
+        <p:nvSpPr>
+          <p:cNvPr id="4" name="TextBox 3">
+            <a:extLst>
+              <a:ext uri="{FF2B5EF4-FFF2-40B4-BE49-F238E27FC236}">
+                <a16:creationId xmlns:a16="http://schemas.microsoft.com/office/drawing/2014/main" id="{F6542FC7-EFE8-0F60-DE1F-3412E945BF3F}"/>
+              </a:ext>
+            </a:extLst>
+          </p:cNvPr>
+          <p:cNvSpPr txBox="1"/>
+          <p:nvPr/>
+        </p:nvSpPr>
+        <p:spPr>
+          <a:xfrm>
+            <a:off x="8423612" y="3244334"/>
+            <a:ext cx="630008" cy="184666"/>
+          </a:xfrm>
+          <a:prstGeom prst="rect">
+            <a:avLst/>
+          </a:prstGeom>
+          <a:noFill/>
+        </p:spPr>
+        <p:txBody>
+          <a:bodyPr wrap="square" rtlCol="0">
+            <a:spAutoFit/>
+          </a:bodyPr>
+          <a:lstStyle/>
+          <a:p>
+            <a:r>
+              <a:rPr lang="en-US" sz="600" dirty="0">
+                <a:latin typeface="Tahoma" panose="020B0604030504040204" pitchFamily="34" charset="0"/>
+                <a:ea typeface="Tahoma" panose="020B0604030504040204" pitchFamily="34" charset="0"/>
+                <a:cs typeface="Tahoma" panose="020B0604030504040204" pitchFamily="34" charset="0"/>
+              </a:rPr>
+              <a:t>1.5 – 3.0 m</a:t>
+            </a:r>
+          </a:p>
+        </p:txBody>
+      </p:sp>
+      <p:sp>
+        <p:nvSpPr>
+          <p:cNvPr id="6" name="TextBox 5">
+            <a:extLst>
+              <a:ext uri="{FF2B5EF4-FFF2-40B4-BE49-F238E27FC236}">
+                <a16:creationId xmlns:a16="http://schemas.microsoft.com/office/drawing/2014/main" id="{ABC459C0-924D-83F6-6C48-A74C8DF84A5C}"/>
+              </a:ext>
+            </a:extLst>
+          </p:cNvPr>
+          <p:cNvSpPr txBox="1"/>
+          <p:nvPr/>
+        </p:nvSpPr>
+        <p:spPr>
+          <a:xfrm>
+            <a:off x="8423612" y="3412327"/>
+            <a:ext cx="630008" cy="184666"/>
+          </a:xfrm>
+          <a:prstGeom prst="rect">
+            <a:avLst/>
+          </a:prstGeom>
+          <a:noFill/>
+        </p:spPr>
+        <p:txBody>
+          <a:bodyPr wrap="square" rtlCol="0">
+            <a:spAutoFit/>
+          </a:bodyPr>
+          <a:lstStyle/>
+          <a:p>
+            <a:r>
+              <a:rPr lang="en-US" sz="600" dirty="0">
+                <a:latin typeface="Tahoma" panose="020B0604030504040204" pitchFamily="34" charset="0"/>
+                <a:ea typeface="Tahoma" panose="020B0604030504040204" pitchFamily="34" charset="0"/>
+                <a:cs typeface="Tahoma" panose="020B0604030504040204" pitchFamily="34" charset="0"/>
+              </a:rPr>
+              <a:t>3.0 - 4.5 m</a:t>
+            </a:r>
+          </a:p>
+        </p:txBody>
+      </p:sp>
+      <p:sp>
+        <p:nvSpPr>
+          <p:cNvPr id="8" name="TextBox 7">
+            <a:extLst>
+              <a:ext uri="{FF2B5EF4-FFF2-40B4-BE49-F238E27FC236}">
+                <a16:creationId xmlns:a16="http://schemas.microsoft.com/office/drawing/2014/main" id="{9EEA50C1-DD3D-B2BA-5ED0-A3A51D478560}"/>
+              </a:ext>
+            </a:extLst>
+          </p:cNvPr>
+          <p:cNvSpPr txBox="1"/>
+          <p:nvPr/>
+        </p:nvSpPr>
+        <p:spPr>
+          <a:xfrm>
+            <a:off x="8423612" y="3580563"/>
+            <a:ext cx="714315" cy="184666"/>
+          </a:xfrm>
+          <a:prstGeom prst="rect">
+            <a:avLst/>
+          </a:prstGeom>
+          <a:noFill/>
+        </p:spPr>
+        <p:txBody>
+          <a:bodyPr wrap="square" rtlCol="0">
+            <a:spAutoFit/>
+          </a:bodyPr>
+          <a:lstStyle/>
+          <a:p>
+            <a:r>
+              <a:rPr lang="en-US" sz="600" dirty="0">
+                <a:latin typeface="Tahoma" panose="020B0604030504040204" pitchFamily="34" charset="0"/>
+                <a:ea typeface="Tahoma" panose="020B0604030504040204" pitchFamily="34" charset="0"/>
+                <a:cs typeface="Tahoma" panose="020B0604030504040204" pitchFamily="34" charset="0"/>
+              </a:rPr>
+              <a:t>4.5 – 7.0 m</a:t>
+            </a:r>
+          </a:p>
+        </p:txBody>
+      </p:sp>
+      <p:sp>
+        <p:nvSpPr>
+          <p:cNvPr id="10" name="TextBox 9">
+            <a:extLst>
+              <a:ext uri="{FF2B5EF4-FFF2-40B4-BE49-F238E27FC236}">
+                <a16:creationId xmlns:a16="http://schemas.microsoft.com/office/drawing/2014/main" id="{8283C7AC-D8E7-667E-537B-1636237A8A88}"/>
+              </a:ext>
+            </a:extLst>
+          </p:cNvPr>
+          <p:cNvSpPr txBox="1"/>
+          <p:nvPr/>
+        </p:nvSpPr>
+        <p:spPr>
+          <a:xfrm>
+            <a:off x="8423612" y="3753563"/>
+            <a:ext cx="714315" cy="184666"/>
+          </a:xfrm>
+          <a:prstGeom prst="rect">
+            <a:avLst/>
+          </a:prstGeom>
+          <a:noFill/>
+        </p:spPr>
+        <p:txBody>
+          <a:bodyPr wrap="square" rtlCol="0">
+            <a:spAutoFit/>
+          </a:bodyPr>
+          <a:lstStyle/>
+          <a:p>
+            <a:r>
+              <a:rPr lang="en-US" sz="600" dirty="0">
+                <a:latin typeface="Tahoma" panose="020B0604030504040204" pitchFamily="34" charset="0"/>
+                <a:ea typeface="Tahoma" panose="020B0604030504040204" pitchFamily="34" charset="0"/>
+                <a:cs typeface="Tahoma" panose="020B0604030504040204" pitchFamily="34" charset="0"/>
+              </a:rPr>
+              <a:t>7.0 – 8.5 m</a:t>
+            </a:r>
+          </a:p>
+        </p:txBody>
+      </p:sp>
+      <p:sp>
+        <p:nvSpPr>
+          <p:cNvPr id="12" name="TextBox 11">
+            <a:extLst>
+              <a:ext uri="{FF2B5EF4-FFF2-40B4-BE49-F238E27FC236}">
+                <a16:creationId xmlns:a16="http://schemas.microsoft.com/office/drawing/2014/main" id="{73D38167-0BC8-3EAA-4E3E-F34C4AC4E5B4}"/>
+              </a:ext>
+            </a:extLst>
+          </p:cNvPr>
+          <p:cNvSpPr txBox="1"/>
+          <p:nvPr/>
+        </p:nvSpPr>
+        <p:spPr>
+          <a:xfrm>
+            <a:off x="8423612" y="3932152"/>
+            <a:ext cx="714315" cy="184666"/>
+          </a:xfrm>
+          <a:prstGeom prst="rect">
+            <a:avLst/>
+          </a:prstGeom>
+          <a:noFill/>
+        </p:spPr>
+        <p:txBody>
+          <a:bodyPr wrap="square" rtlCol="0">
+            <a:spAutoFit/>
+          </a:bodyPr>
+          <a:lstStyle/>
+          <a:p>
+            <a:r>
+              <a:rPr lang="en-US" sz="600" dirty="0">
+                <a:latin typeface="Tahoma" panose="020B0604030504040204" pitchFamily="34" charset="0"/>
+                <a:ea typeface="Tahoma" panose="020B0604030504040204" pitchFamily="34" charset="0"/>
+                <a:cs typeface="Tahoma" panose="020B0604030504040204" pitchFamily="34" charset="0"/>
+              </a:rPr>
+              <a:t>8.5 – 10.0 m</a:t>
+            </a:r>
+          </a:p>
+        </p:txBody>
+      </p:sp>
+      <p:sp>
+        <p:nvSpPr>
+          <p:cNvPr id="14" name="TextBox 13">
+            <a:extLst>
+              <a:ext uri="{FF2B5EF4-FFF2-40B4-BE49-F238E27FC236}">
+                <a16:creationId xmlns:a16="http://schemas.microsoft.com/office/drawing/2014/main" id="{6A67DC08-3AB5-BEE4-CCE1-86DF28C78F34}"/>
+              </a:ext>
+            </a:extLst>
+          </p:cNvPr>
+          <p:cNvSpPr txBox="1"/>
+          <p:nvPr/>
+        </p:nvSpPr>
+        <p:spPr>
+          <a:xfrm>
+            <a:off x="8423612" y="4089374"/>
+            <a:ext cx="714315" cy="184666"/>
+          </a:xfrm>
+          <a:prstGeom prst="rect">
+            <a:avLst/>
+          </a:prstGeom>
+          <a:noFill/>
+        </p:spPr>
+        <p:txBody>
+          <a:bodyPr wrap="square" rtlCol="0">
+            <a:spAutoFit/>
+          </a:bodyPr>
+          <a:lstStyle/>
+          <a:p>
+            <a:r>
+              <a:rPr lang="en-US" sz="600" dirty="0">
+                <a:latin typeface="Tahoma" panose="020B0604030504040204" pitchFamily="34" charset="0"/>
+                <a:ea typeface="Tahoma" panose="020B0604030504040204" pitchFamily="34" charset="0"/>
+                <a:cs typeface="Tahoma" panose="020B0604030504040204" pitchFamily="34" charset="0"/>
+              </a:rPr>
+              <a:t>10.0 – 13.0 m</a:t>
+            </a:r>
+          </a:p>
+        </p:txBody>
+      </p:sp>
+      <p:sp>
+        <p:nvSpPr>
+          <p:cNvPr id="15" name="TextBox 14">
+            <a:extLst>
+              <a:ext uri="{FF2B5EF4-FFF2-40B4-BE49-F238E27FC236}">
+                <a16:creationId xmlns:a16="http://schemas.microsoft.com/office/drawing/2014/main" id="{DE803422-D033-12F3-5C88-EB483EB2524A}"/>
+              </a:ext>
+            </a:extLst>
+          </p:cNvPr>
+          <p:cNvSpPr txBox="1"/>
+          <p:nvPr/>
+        </p:nvSpPr>
+        <p:spPr>
+          <a:xfrm>
+            <a:off x="8423612" y="4249292"/>
+            <a:ext cx="714315" cy="184666"/>
+          </a:xfrm>
+          <a:prstGeom prst="rect">
+            <a:avLst/>
+          </a:prstGeom>
+          <a:noFill/>
+        </p:spPr>
+        <p:txBody>
+          <a:bodyPr wrap="square" rtlCol="0">
+            <a:spAutoFit/>
+          </a:bodyPr>
+          <a:lstStyle/>
+          <a:p>
+            <a:r>
+              <a:rPr lang="en-US" sz="600" dirty="0">
+                <a:latin typeface="Tahoma" panose="020B0604030504040204" pitchFamily="34" charset="0"/>
+                <a:ea typeface="Tahoma" panose="020B0604030504040204" pitchFamily="34" charset="0"/>
+                <a:cs typeface="Tahoma" panose="020B0604030504040204" pitchFamily="34" charset="0"/>
+              </a:rPr>
+              <a:t>13.0 – 16.0 m</a:t>
+            </a:r>
+          </a:p>
+        </p:txBody>
+      </p:sp>
+      <p:sp>
+        <p:nvSpPr>
+          <p:cNvPr id="16" name="TextBox 15">
+            <a:extLst>
+              <a:ext uri="{FF2B5EF4-FFF2-40B4-BE49-F238E27FC236}">
+                <a16:creationId xmlns:a16="http://schemas.microsoft.com/office/drawing/2014/main" id="{90487A63-786A-8430-E1D4-401A2D026CBA}"/>
+              </a:ext>
+            </a:extLst>
+          </p:cNvPr>
+          <p:cNvSpPr txBox="1"/>
+          <p:nvPr/>
+        </p:nvSpPr>
+        <p:spPr>
+          <a:xfrm>
+            <a:off x="8423612" y="4414949"/>
+            <a:ext cx="714315" cy="184666"/>
+          </a:xfrm>
+          <a:prstGeom prst="rect">
+            <a:avLst/>
+          </a:prstGeom>
+          <a:noFill/>
+        </p:spPr>
+        <p:txBody>
+          <a:bodyPr wrap="square" rtlCol="0">
+            <a:spAutoFit/>
+          </a:bodyPr>
+          <a:lstStyle/>
+          <a:p>
+            <a:r>
+              <a:rPr lang="en-US" sz="600" dirty="0">
+                <a:latin typeface="Tahoma" panose="020B0604030504040204" pitchFamily="34" charset="0"/>
+                <a:ea typeface="Tahoma" panose="020B0604030504040204" pitchFamily="34" charset="0"/>
+                <a:cs typeface="Tahoma" panose="020B0604030504040204" pitchFamily="34" charset="0"/>
+              </a:rPr>
+              <a:t>16.0 – 19.0 m</a:t>
+            </a:r>
+          </a:p>
+        </p:txBody>
+      </p:sp>
+      <p:sp>
+        <p:nvSpPr>
+          <p:cNvPr id="17" name="TextBox 16">
+            <a:extLst>
+              <a:ext uri="{FF2B5EF4-FFF2-40B4-BE49-F238E27FC236}">
+                <a16:creationId xmlns:a16="http://schemas.microsoft.com/office/drawing/2014/main" id="{F6CB3698-0584-E54C-C2A8-88E38234A571}"/>
+              </a:ext>
+            </a:extLst>
+          </p:cNvPr>
+          <p:cNvSpPr txBox="1"/>
+          <p:nvPr/>
+        </p:nvSpPr>
+        <p:spPr>
+          <a:xfrm>
+            <a:off x="8423612" y="4587035"/>
+            <a:ext cx="714315" cy="184666"/>
+          </a:xfrm>
+          <a:prstGeom prst="rect">
+            <a:avLst/>
+          </a:prstGeom>
+          <a:noFill/>
+        </p:spPr>
+        <p:txBody>
+          <a:bodyPr wrap="square" rtlCol="0">
+            <a:spAutoFit/>
+          </a:bodyPr>
+          <a:lstStyle/>
+          <a:p>
+            <a:r>
+              <a:rPr lang="en-US" sz="600" dirty="0">
+                <a:latin typeface="Tahoma" panose="020B0604030504040204" pitchFamily="34" charset="0"/>
+                <a:ea typeface="Tahoma" panose="020B0604030504040204" pitchFamily="34" charset="0"/>
+                <a:cs typeface="Tahoma" panose="020B0604030504040204" pitchFamily="34" charset="0"/>
+              </a:rPr>
+              <a:t>19.0 – 25.0 m</a:t>
+            </a:r>
+          </a:p>
+        </p:txBody>
+      </p:sp>
+      <p:sp>
+        <p:nvSpPr>
+          <p:cNvPr id="18" name="TextBox 17">
+            <a:extLst>
+              <a:ext uri="{FF2B5EF4-FFF2-40B4-BE49-F238E27FC236}">
+                <a16:creationId xmlns:a16="http://schemas.microsoft.com/office/drawing/2014/main" id="{4DAEFF53-4D8C-A4B3-919D-287B8092B51C}"/>
+              </a:ext>
+            </a:extLst>
+          </p:cNvPr>
+          <p:cNvSpPr txBox="1"/>
+          <p:nvPr/>
+        </p:nvSpPr>
+        <p:spPr>
+          <a:xfrm>
+            <a:off x="8423612" y="4746914"/>
+            <a:ext cx="714315" cy="184666"/>
+          </a:xfrm>
+          <a:prstGeom prst="rect">
+            <a:avLst/>
+          </a:prstGeom>
+          <a:noFill/>
+        </p:spPr>
+        <p:txBody>
+          <a:bodyPr wrap="square" rtlCol="0">
+            <a:spAutoFit/>
+          </a:bodyPr>
+          <a:lstStyle/>
+          <a:p>
+            <a:r>
+              <a:rPr lang="en-US" sz="600" dirty="0">
+                <a:latin typeface="Tahoma" panose="020B0604030504040204" pitchFamily="34" charset="0"/>
+                <a:ea typeface="Tahoma" panose="020B0604030504040204" pitchFamily="34" charset="0"/>
+                <a:cs typeface="Tahoma" panose="020B0604030504040204" pitchFamily="34" charset="0"/>
+              </a:rPr>
+              <a:t>25.0 – 31.0 m</a:t>
+            </a:r>
+          </a:p>
+        </p:txBody>
+      </p:sp>
+      <p:sp>
+        <p:nvSpPr>
+          <p:cNvPr id="19" name="TextBox 18">
+            <a:extLst>
+              <a:ext uri="{FF2B5EF4-FFF2-40B4-BE49-F238E27FC236}">
+                <a16:creationId xmlns:a16="http://schemas.microsoft.com/office/drawing/2014/main" id="{6245719C-9639-196F-ACF5-C12DC2D7993E}"/>
+              </a:ext>
+            </a:extLst>
+          </p:cNvPr>
+          <p:cNvSpPr txBox="1"/>
+          <p:nvPr/>
+        </p:nvSpPr>
+        <p:spPr>
+          <a:xfrm>
+            <a:off x="8423612" y="3064715"/>
+            <a:ext cx="733412" cy="184666"/>
+          </a:xfrm>
+          <a:prstGeom prst="rect">
+            <a:avLst/>
+          </a:prstGeom>
+          <a:noFill/>
+        </p:spPr>
+        <p:txBody>
+          <a:bodyPr wrap="square" rtlCol="0">
+            <a:spAutoFit/>
+          </a:bodyPr>
+          <a:lstStyle/>
+          <a:p>
+            <a:r>
+              <a:rPr lang="en-US" sz="600" dirty="0">
+                <a:latin typeface="Tahoma" panose="020B0604030504040204" pitchFamily="34" charset="0"/>
+                <a:ea typeface="Tahoma" panose="020B0604030504040204" pitchFamily="34" charset="0"/>
+                <a:cs typeface="Tahoma" panose="020B0604030504040204" pitchFamily="34" charset="0"/>
+              </a:rPr>
+              <a:t>River Channel</a:t>
+            </a:r>
+          </a:p>
+        </p:txBody>
+      </p:sp>
+      <p:sp>
+        <p:nvSpPr>
+          <p:cNvPr id="21" name="TextBox 20">
+            <a:extLst>
+              <a:ext uri="{FF2B5EF4-FFF2-40B4-BE49-F238E27FC236}">
+                <a16:creationId xmlns:a16="http://schemas.microsoft.com/office/drawing/2014/main" id="{919891DA-29C7-1E98-334F-DB7AFA65C17C}"/>
+              </a:ext>
+            </a:extLst>
+          </p:cNvPr>
+          <p:cNvSpPr txBox="1"/>
+          <p:nvPr/>
+        </p:nvSpPr>
+        <p:spPr>
+          <a:xfrm>
+            <a:off x="8423612" y="2911415"/>
+            <a:ext cx="733412" cy="184666"/>
+          </a:xfrm>
+          <a:prstGeom prst="rect">
+            <a:avLst/>
+          </a:prstGeom>
+          <a:noFill/>
+        </p:spPr>
+        <p:txBody>
+          <a:bodyPr wrap="square" rtlCol="0">
+            <a:spAutoFit/>
+          </a:bodyPr>
+          <a:lstStyle/>
+          <a:p>
+            <a:r>
+              <a:rPr lang="en-US" sz="600" dirty="0">
+                <a:latin typeface="Tahoma" panose="020B0604030504040204" pitchFamily="34" charset="0"/>
+                <a:ea typeface="Tahoma" panose="020B0604030504040204" pitchFamily="34" charset="0"/>
+                <a:cs typeface="Tahoma" panose="020B0604030504040204" pitchFamily="34" charset="0"/>
+              </a:rPr>
+              <a:t>Grass buffer</a:t>
+            </a:r>
+          </a:p>
+        </p:txBody>
+      </p:sp>
+      <p:sp>
+        <p:nvSpPr>
+          <p:cNvPr id="22" name="TextBox 21">
+            <a:extLst>
+              <a:ext uri="{FF2B5EF4-FFF2-40B4-BE49-F238E27FC236}">
+                <a16:creationId xmlns:a16="http://schemas.microsoft.com/office/drawing/2014/main" id="{200902CA-D09D-F5D8-6C88-97865186DD71}"/>
+              </a:ext>
+            </a:extLst>
+          </p:cNvPr>
+          <p:cNvSpPr txBox="1"/>
+          <p:nvPr/>
+        </p:nvSpPr>
+        <p:spPr>
+          <a:xfrm>
+            <a:off x="8423612" y="2753566"/>
+            <a:ext cx="733412" cy="184666"/>
+          </a:xfrm>
+          <a:prstGeom prst="rect">
+            <a:avLst/>
+          </a:prstGeom>
+          <a:noFill/>
+        </p:spPr>
+        <p:txBody>
+          <a:bodyPr wrap="square" rtlCol="0">
+            <a:spAutoFit/>
+          </a:bodyPr>
+          <a:lstStyle/>
+          <a:p>
+            <a:r>
+              <a:rPr lang="en-US" sz="600" dirty="0">
+                <a:latin typeface="Tahoma" panose="020B0604030504040204" pitchFamily="34" charset="0"/>
+                <a:ea typeface="Tahoma" panose="020B0604030504040204" pitchFamily="34" charset="0"/>
+                <a:cs typeface="Tahoma" panose="020B0604030504040204" pitchFamily="34" charset="0"/>
+              </a:rPr>
+              <a:t>Forest buffer</a:t>
             </a:r>
           </a:p>
         </p:txBody>

</xml_diff>